<commit_message>
done with adding slides
</commit_message>
<xml_diff>
--- a/presentation.pptx
+++ b/presentation.pptx
@@ -38,17 +38,25 @@
     <p:sldId id="281" r:id="rId32"/>
     <p:sldId id="282" r:id="rId33"/>
     <p:sldId id="283" r:id="rId34"/>
-    <p:sldId id="297" r:id="rId35"/>
-    <p:sldId id="299" r:id="rId36"/>
-    <p:sldId id="298" r:id="rId37"/>
-    <p:sldId id="286" r:id="rId38"/>
-    <p:sldId id="287" r:id="rId39"/>
-    <p:sldId id="288" r:id="rId40"/>
-    <p:sldId id="289" r:id="rId41"/>
-    <p:sldId id="290" r:id="rId42"/>
-    <p:sldId id="291" r:id="rId43"/>
-    <p:sldId id="292" r:id="rId44"/>
-    <p:sldId id="293" r:id="rId45"/>
+    <p:sldId id="300" r:id="rId35"/>
+    <p:sldId id="301" r:id="rId36"/>
+    <p:sldId id="297" r:id="rId37"/>
+    <p:sldId id="302" r:id="rId38"/>
+    <p:sldId id="303" r:id="rId39"/>
+    <p:sldId id="299" r:id="rId40"/>
+    <p:sldId id="304" r:id="rId41"/>
+    <p:sldId id="305" r:id="rId42"/>
+    <p:sldId id="298" r:id="rId43"/>
+    <p:sldId id="306" r:id="rId44"/>
+    <p:sldId id="307" r:id="rId45"/>
+    <p:sldId id="308" r:id="rId46"/>
+    <p:sldId id="287" r:id="rId47"/>
+    <p:sldId id="288" r:id="rId48"/>
+    <p:sldId id="289" r:id="rId49"/>
+    <p:sldId id="290" r:id="rId50"/>
+    <p:sldId id="291" r:id="rId51"/>
+    <p:sldId id="292" r:id="rId52"/>
+    <p:sldId id="293" r:id="rId53"/>
   </p:sldIdLst>
   <p:sldSz cx="9144000" cy="6858000" type="screen4x3"/>
   <p:notesSz cx="6858000" cy="9144000"/>
@@ -5689,7 +5697,7 @@
             </a:pPr>
             <a:r>
               <a:rPr lang="en-US" dirty="0" smtClean="0"/>
-              <a:t>Motivation and Research Goals</a:t>
+              <a:t>Motivation</a:t>
             </a:r>
           </a:p>
           <a:p>
@@ -5710,6 +5718,46 @@
             <a:r>
               <a:rPr lang="en-US" dirty="0" smtClean="0"/>
               <a:t>Basics</a:t>
+            </a:r>
+          </a:p>
+          <a:p>
+            <a:pPr marL="457200" indent="-457200">
+              <a:buFont typeface="+mj-lt"/>
+              <a:buAutoNum type="arabicPeriod"/>
+            </a:pPr>
+            <a:r>
+              <a:rPr lang="en-US" dirty="0" smtClean="0"/>
+              <a:t>Contributions</a:t>
+            </a:r>
+          </a:p>
+          <a:p>
+            <a:pPr marL="457200" indent="-457200">
+              <a:buFont typeface="+mj-lt"/>
+              <a:buAutoNum type="arabicPeriod"/>
+            </a:pPr>
+            <a:r>
+              <a:rPr lang="en-US" dirty="0" smtClean="0"/>
+              <a:t>Evaluation</a:t>
+            </a:r>
+          </a:p>
+          <a:p>
+            <a:pPr marL="457200" indent="-457200">
+              <a:buFont typeface="+mj-lt"/>
+              <a:buAutoNum type="arabicPeriod"/>
+            </a:pPr>
+            <a:r>
+              <a:rPr lang="en-US" dirty="0" smtClean="0"/>
+              <a:t>Future Work</a:t>
+            </a:r>
+          </a:p>
+          <a:p>
+            <a:pPr marL="457200" indent="-457200">
+              <a:buFont typeface="+mj-lt"/>
+              <a:buAutoNum type="arabicPeriod"/>
+            </a:pPr>
+            <a:r>
+              <a:rPr lang="en-US" dirty="0" smtClean="0"/>
+              <a:t>Conclusion</a:t>
             </a:r>
           </a:p>
           <a:p>
@@ -6239,7 +6287,7 @@
             <p:ph idx="1"/>
           </p:nvPr>
         </p:nvPicPr>
-        <p:blipFill>
+        <p:blipFill rotWithShape="1">
           <a:blip r:embed="rId2">
             <a:extLst>
               <a:ext uri="{28A0092B-C50C-407E-A947-70E740481C1C}">
@@ -6247,10 +6295,8 @@
               </a:ext>
             </a:extLst>
           </a:blip>
-          <a:srcRect t="1766" b="1766"/>
-          <a:stretch>
-            <a:fillRect/>
-          </a:stretch>
+          <a:srcRect l="-1831" r="-1831"/>
+          <a:stretch/>
         </p:blipFill>
         <p:spPr/>
       </p:pic>
@@ -6802,8 +6848,12 @@
               </a:lnSpc>
             </a:pPr>
             <a:r>
+              <a:rPr lang="en-US" sz="2000" dirty="0"/>
+              <a:t>E</a:t>
+            </a:r>
+            <a:r>
               <a:rPr lang="en-US" sz="2000" dirty="0" smtClean="0"/>
-              <a:t>Previous execution times per device</a:t>
+              <a:t>xecution times per device</a:t>
             </a:r>
           </a:p>
           <a:p>
@@ -6825,7 +6875,7 @@
             </a:pPr>
             <a:r>
               <a:rPr lang="en-US" sz="2000" dirty="0" smtClean="0"/>
-              <a:t>Previously transferred data size</a:t>
+              <a:t>Transferred data size</a:t>
             </a:r>
             <a:endParaRPr lang="en-US" sz="2000" dirty="0"/>
           </a:p>
@@ -7401,7 +7451,7 @@
             </a:pPr>
             <a:r>
               <a:rPr lang="en-US" dirty="0" smtClean="0"/>
-              <a:t>Matrix Multiplication</a:t>
+              <a:t>Matrix Multiplication (data-heavy)</a:t>
             </a:r>
           </a:p>
           <a:p>
@@ -7411,7 +7461,7 @@
             </a:pPr>
             <a:r>
               <a:rPr lang="en-US" dirty="0" smtClean="0"/>
-              <a:t>Mandelbrot Set</a:t>
+              <a:t>Mandelbrot Set (computation-heavy)</a:t>
             </a:r>
           </a:p>
           <a:p>
@@ -7421,7 +7471,7 @@
             </a:pPr>
             <a:r>
               <a:rPr lang="en-US" dirty="0" smtClean="0"/>
-              <a:t>Multiple jobs in parallel (Matrix Multiplication, Mandelbrot, K-means, N-body)</a:t>
+              <a:t>Multiple jobs in parallel: Matrix Multiplication, Mandelbrot, K-means and N-body</a:t>
             </a:r>
             <a:endParaRPr lang="en-US" dirty="0"/>
           </a:p>
@@ -7480,25 +7530,29 @@
           </a:p>
         </p:txBody>
       </p:sp>
-      <p:sp>
-        <p:nvSpPr>
-          <p:cNvPr id="12" name="Content Placeholder 11"/>
-          <p:cNvSpPr>
-            <a:spLocks noGrp="1"/>
-          </p:cNvSpPr>
+      <p:pic>
+        <p:nvPicPr>
+          <p:cNvPr id="15" name="Content Placeholder 14" descr="fully_assisted.pdf"/>
+          <p:cNvPicPr>
+            <a:picLocks noGrp="1" noChangeAspect="1"/>
+          </p:cNvPicPr>
           <p:nvPr>
             <p:ph idx="1"/>
           </p:nvPr>
-        </p:nvSpPr>
-        <p:spPr/>
-        <p:txBody>
-          <a:bodyPr/>
-          <a:lstStyle/>
-          <a:p>
-            <a:endParaRPr lang="en-US"/>
-          </a:p>
-        </p:txBody>
-      </p:sp>
+        </p:nvPicPr>
+        <p:blipFill rotWithShape="1">
+          <a:blip r:embed="rId2">
+            <a:extLst>
+              <a:ext uri="{28A0092B-C50C-407E-A947-70E740481C1C}">
+                <a14:useLocalDpi xmlns:a14="http://schemas.microsoft.com/office/drawing/2010/main" val="0"/>
+              </a:ext>
+            </a:extLst>
+          </a:blip>
+          <a:srcRect t="-28509" b="-28509"/>
+          <a:stretch/>
+        </p:blipFill>
+        <p:spPr/>
+      </p:pic>
     </p:spTree>
     <p:extLst>
       <p:ext uri="{BB962C8B-B14F-4D97-AF65-F5344CB8AC3E}">
@@ -7546,35 +7600,47 @@
           <a:p>
             <a:r>
               <a:rPr lang="en-US" dirty="0" smtClean="0"/>
-              <a:t>Local partly assisted setup</a:t>
+              <a:t>Fully assisted Matrix </a:t>
+            </a:r>
+            <a:r>
+              <a:rPr lang="en-US" dirty="0" err="1" smtClean="0"/>
+              <a:t>Mult</a:t>
+            </a:r>
+            <a:r>
+              <a:rPr lang="en-US" dirty="0" smtClean="0"/>
+              <a:t>.</a:t>
             </a:r>
             <a:endParaRPr lang="en-US" dirty="0"/>
           </a:p>
         </p:txBody>
       </p:sp>
-      <p:sp>
-        <p:nvSpPr>
-          <p:cNvPr id="3" name="Content Placeholder 2"/>
-          <p:cNvSpPr>
-            <a:spLocks noGrp="1"/>
-          </p:cNvSpPr>
+      <p:pic>
+        <p:nvPicPr>
+          <p:cNvPr id="4" name="Content Placeholder 3" descr="local_fully_assisted_matrix.pdf"/>
+          <p:cNvPicPr>
+            <a:picLocks noGrp="1" noChangeAspect="1"/>
+          </p:cNvPicPr>
           <p:nvPr>
             <p:ph idx="1"/>
           </p:nvPr>
-        </p:nvSpPr>
-        <p:spPr/>
-        <p:txBody>
-          <a:bodyPr/>
-          <a:lstStyle/>
-          <a:p>
-            <a:endParaRPr lang="en-US"/>
-          </a:p>
-        </p:txBody>
-      </p:sp>
+        </p:nvPicPr>
+        <p:blipFill rotWithShape="1">
+          <a:blip r:embed="rId2">
+            <a:extLst>
+              <a:ext uri="{28A0092B-C50C-407E-A947-70E740481C1C}">
+                <a14:useLocalDpi xmlns:a14="http://schemas.microsoft.com/office/drawing/2010/main" val="0"/>
+              </a:ext>
+            </a:extLst>
+          </a:blip>
+          <a:srcRect t="-3145" b="-3145"/>
+          <a:stretch/>
+        </p:blipFill>
+        <p:spPr/>
+      </p:pic>
     </p:spTree>
     <p:extLst>
       <p:ext uri="{BB962C8B-B14F-4D97-AF65-F5344CB8AC3E}">
-        <p14:creationId xmlns:p14="http://schemas.microsoft.com/office/powerpoint/2010/main" val="1141723089"/>
+        <p14:creationId xmlns:p14="http://schemas.microsoft.com/office/powerpoint/2010/main" val="2602457989"/>
       </p:ext>
     </p:extLst>
   </p:cSld>
@@ -7618,35 +7684,39 @@
           <a:p>
             <a:r>
               <a:rPr lang="en-US" dirty="0" smtClean="0"/>
-              <a:t>cloud</a:t>
+              <a:t>Fully Assisted Mandelbrot</a:t>
             </a:r>
             <a:endParaRPr lang="en-US" dirty="0"/>
           </a:p>
         </p:txBody>
       </p:sp>
-      <p:sp>
-        <p:nvSpPr>
-          <p:cNvPr id="3" name="Content Placeholder 2"/>
-          <p:cNvSpPr>
-            <a:spLocks noGrp="1"/>
-          </p:cNvSpPr>
+      <p:pic>
+        <p:nvPicPr>
+          <p:cNvPr id="4" name="Content Placeholder 3" descr="local_fully_assited_mandelbrot.pdf"/>
+          <p:cNvPicPr>
+            <a:picLocks noGrp="1" noChangeAspect="1"/>
+          </p:cNvPicPr>
           <p:nvPr>
             <p:ph idx="1"/>
           </p:nvPr>
-        </p:nvSpPr>
-        <p:spPr/>
-        <p:txBody>
-          <a:bodyPr/>
-          <a:lstStyle/>
-          <a:p>
-            <a:endParaRPr lang="en-US"/>
-          </a:p>
-        </p:txBody>
-      </p:sp>
+        </p:nvPicPr>
+        <p:blipFill rotWithShape="1">
+          <a:blip r:embed="rId2">
+            <a:extLst>
+              <a:ext uri="{28A0092B-C50C-407E-A947-70E740481C1C}">
+                <a14:useLocalDpi xmlns:a14="http://schemas.microsoft.com/office/drawing/2010/main" val="0"/>
+              </a:ext>
+            </a:extLst>
+          </a:blip>
+          <a:srcRect t="-1750" b="-1750"/>
+          <a:stretch/>
+        </p:blipFill>
+        <p:spPr/>
+      </p:pic>
     </p:spTree>
     <p:extLst>
       <p:ext uri="{BB962C8B-B14F-4D97-AF65-F5344CB8AC3E}">
-        <p14:creationId xmlns:p14="http://schemas.microsoft.com/office/powerpoint/2010/main" val="886036096"/>
+        <p14:creationId xmlns:p14="http://schemas.microsoft.com/office/powerpoint/2010/main" val="3870610882"/>
       </p:ext>
     </p:extLst>
   </p:cSld>
@@ -7690,35 +7760,39 @@
           <a:p>
             <a:r>
               <a:rPr lang="en-US" dirty="0" smtClean="0"/>
-              <a:t>Hybrid</a:t>
+              <a:t>Local partly assisted setup</a:t>
             </a:r>
             <a:endParaRPr lang="en-US" dirty="0"/>
           </a:p>
         </p:txBody>
       </p:sp>
-      <p:sp>
-        <p:nvSpPr>
-          <p:cNvPr id="3" name="Content Placeholder 2"/>
-          <p:cNvSpPr>
-            <a:spLocks noGrp="1"/>
-          </p:cNvSpPr>
+      <p:pic>
+        <p:nvPicPr>
+          <p:cNvPr id="6" name="Content Placeholder 5" descr="partly_assisted.pdf"/>
+          <p:cNvPicPr>
+            <a:picLocks noGrp="1" noChangeAspect="1"/>
+          </p:cNvPicPr>
           <p:nvPr>
             <p:ph idx="1"/>
           </p:nvPr>
-        </p:nvSpPr>
-        <p:spPr/>
-        <p:txBody>
-          <a:bodyPr/>
-          <a:lstStyle/>
-          <a:p>
-            <a:endParaRPr lang="en-US"/>
-          </a:p>
-        </p:txBody>
-      </p:sp>
+        </p:nvPicPr>
+        <p:blipFill rotWithShape="1">
+          <a:blip r:embed="rId2">
+            <a:extLst>
+              <a:ext uri="{28A0092B-C50C-407E-A947-70E740481C1C}">
+                <a14:useLocalDpi xmlns:a14="http://schemas.microsoft.com/office/drawing/2010/main" val="0"/>
+              </a:ext>
+            </a:extLst>
+          </a:blip>
+          <a:srcRect t="-28509" b="-28509"/>
+          <a:stretch/>
+        </p:blipFill>
+        <p:spPr/>
+      </p:pic>
     </p:spTree>
     <p:extLst>
       <p:ext uri="{BB962C8B-B14F-4D97-AF65-F5344CB8AC3E}">
-        <p14:creationId xmlns:p14="http://schemas.microsoft.com/office/powerpoint/2010/main" val="2148316696"/>
+        <p14:creationId xmlns:p14="http://schemas.microsoft.com/office/powerpoint/2010/main" val="1141723089"/>
       </p:ext>
     </p:extLst>
   </p:cSld>
@@ -7747,7 +7821,7 @@
       </p:grpSpPr>
       <p:sp>
         <p:nvSpPr>
-          <p:cNvPr id="4" name="Title 3"/>
+          <p:cNvPr id="2" name="Title 1"/>
           <p:cNvSpPr>
             <a:spLocks noGrp="1"/>
           </p:cNvSpPr>
@@ -7762,35 +7836,47 @@
           <a:p>
             <a:r>
               <a:rPr lang="en-US" dirty="0" smtClean="0"/>
-              <a:t>Demo</a:t>
+              <a:t>Partly assisted matrix </a:t>
+            </a:r>
+            <a:r>
+              <a:rPr lang="en-US" dirty="0" err="1" smtClean="0"/>
+              <a:t>Mult</a:t>
+            </a:r>
+            <a:r>
+              <a:rPr lang="en-US" dirty="0" smtClean="0"/>
+              <a:t>.</a:t>
             </a:r>
             <a:endParaRPr lang="en-US" dirty="0"/>
           </a:p>
         </p:txBody>
       </p:sp>
-      <p:sp>
-        <p:nvSpPr>
-          <p:cNvPr id="5" name="Text Placeholder 4"/>
-          <p:cNvSpPr>
-            <a:spLocks noGrp="1"/>
-          </p:cNvSpPr>
-          <p:nvPr>
-            <p:ph type="body" idx="1"/>
-          </p:nvPr>
-        </p:nvSpPr>
-        <p:spPr/>
-        <p:txBody>
-          <a:bodyPr/>
-          <a:lstStyle/>
-          <a:p>
-            <a:endParaRPr lang="en-US"/>
-          </a:p>
-        </p:txBody>
-      </p:sp>
+      <p:pic>
+        <p:nvPicPr>
+          <p:cNvPr id="4" name="Content Placeholder 3" descr="local_partially_assisted_matrix.pdf"/>
+          <p:cNvPicPr>
+            <a:picLocks noGrp="1" noChangeAspect="1"/>
+          </p:cNvPicPr>
+          <p:nvPr>
+            <p:ph idx="1"/>
+          </p:nvPr>
+        </p:nvPicPr>
+        <p:blipFill rotWithShape="1">
+          <a:blip r:embed="rId2">
+            <a:extLst>
+              <a:ext uri="{28A0092B-C50C-407E-A947-70E740481C1C}">
+                <a14:useLocalDpi xmlns:a14="http://schemas.microsoft.com/office/drawing/2010/main" val="0"/>
+              </a:ext>
+            </a:extLst>
+          </a:blip>
+          <a:srcRect l="-2959" r="-2959"/>
+          <a:stretch/>
+        </p:blipFill>
+        <p:spPr/>
+      </p:pic>
     </p:spTree>
     <p:extLst>
       <p:ext uri="{BB962C8B-B14F-4D97-AF65-F5344CB8AC3E}">
-        <p14:creationId xmlns:p14="http://schemas.microsoft.com/office/powerpoint/2010/main" val="3250507882"/>
+        <p14:creationId xmlns:p14="http://schemas.microsoft.com/office/powerpoint/2010/main" val="3852662549"/>
       </p:ext>
     </p:extLst>
   </p:cSld>
@@ -7834,6 +7920,782 @@
           <a:p>
             <a:r>
               <a:rPr lang="en-US" dirty="0" smtClean="0"/>
+              <a:t>Partly assisted </a:t>
+            </a:r>
+            <a:r>
+              <a:rPr lang="en-US" dirty="0" err="1" smtClean="0"/>
+              <a:t>mandelbrot</a:t>
+            </a:r>
+            <a:endParaRPr lang="en-US" dirty="0"/>
+          </a:p>
+        </p:txBody>
+      </p:sp>
+      <p:pic>
+        <p:nvPicPr>
+          <p:cNvPr id="4" name="Content Placeholder 3" descr="local_partially_assisted_mandelbrot.pdf"/>
+          <p:cNvPicPr>
+            <a:picLocks noGrp="1" noChangeAspect="1"/>
+          </p:cNvPicPr>
+          <p:nvPr>
+            <p:ph idx="1"/>
+          </p:nvPr>
+        </p:nvPicPr>
+        <p:blipFill rotWithShape="1">
+          <a:blip r:embed="rId2">
+            <a:extLst>
+              <a:ext uri="{28A0092B-C50C-407E-A947-70E740481C1C}">
+                <a14:useLocalDpi xmlns:a14="http://schemas.microsoft.com/office/drawing/2010/main" val="0"/>
+              </a:ext>
+            </a:extLst>
+          </a:blip>
+          <a:srcRect l="-4594" r="-4594"/>
+          <a:stretch/>
+        </p:blipFill>
+        <p:spPr/>
+      </p:pic>
+    </p:spTree>
+    <p:extLst>
+      <p:ext uri="{BB962C8B-B14F-4D97-AF65-F5344CB8AC3E}">
+        <p14:creationId xmlns:p14="http://schemas.microsoft.com/office/powerpoint/2010/main" val="620740824"/>
+      </p:ext>
+    </p:extLst>
+  </p:cSld>
+  <p:clrMapOvr>
+    <a:masterClrMapping/>
+  </p:clrMapOvr>
+</p:sld>
+</file>
+
+<file path=ppt/slides/slide39.xml><?xml version="1.0" encoding="utf-8"?>
+<p:sld xmlns:a="http://schemas.openxmlformats.org/drawingml/2006/main" xmlns:r="http://schemas.openxmlformats.org/officeDocument/2006/relationships" xmlns:p="http://schemas.openxmlformats.org/presentationml/2006/main">
+  <p:cSld>
+    <p:spTree>
+      <p:nvGrpSpPr>
+        <p:cNvPr id="1" name=""/>
+        <p:cNvGrpSpPr/>
+        <p:nvPr/>
+      </p:nvGrpSpPr>
+      <p:grpSpPr>
+        <a:xfrm>
+          <a:off x="0" y="0"/>
+          <a:ext cx="0" cy="0"/>
+          <a:chOff x="0" y="0"/>
+          <a:chExt cx="0" cy="0"/>
+        </a:xfrm>
+      </p:grpSpPr>
+      <p:sp>
+        <p:nvSpPr>
+          <p:cNvPr id="2" name="Title 1"/>
+          <p:cNvSpPr>
+            <a:spLocks noGrp="1"/>
+          </p:cNvSpPr>
+          <p:nvPr>
+            <p:ph type="title"/>
+          </p:nvPr>
+        </p:nvSpPr>
+        <p:spPr/>
+        <p:txBody>
+          <a:bodyPr/>
+          <a:lstStyle/>
+          <a:p>
+            <a:r>
+              <a:rPr lang="en-US" dirty="0" err="1" smtClean="0"/>
+              <a:t>ClouD</a:t>
+            </a:r>
+            <a:endParaRPr lang="en-US" dirty="0"/>
+          </a:p>
+        </p:txBody>
+      </p:sp>
+      <p:pic>
+        <p:nvPicPr>
+          <p:cNvPr id="8" name="Content Placeholder 7" descr="cloud.pdf"/>
+          <p:cNvPicPr>
+            <a:picLocks noGrp="1" noChangeAspect="1"/>
+          </p:cNvPicPr>
+          <p:nvPr>
+            <p:ph idx="1"/>
+          </p:nvPr>
+        </p:nvPicPr>
+        <p:blipFill rotWithShape="1">
+          <a:blip r:embed="rId2">
+            <a:extLst>
+              <a:ext uri="{28A0092B-C50C-407E-A947-70E740481C1C}">
+                <a14:useLocalDpi xmlns:a14="http://schemas.microsoft.com/office/drawing/2010/main" val="0"/>
+              </a:ext>
+            </a:extLst>
+          </a:blip>
+          <a:srcRect t="-5519" b="-5519"/>
+          <a:stretch/>
+        </p:blipFill>
+        <p:spPr/>
+      </p:pic>
+    </p:spTree>
+    <p:extLst>
+      <p:ext uri="{BB962C8B-B14F-4D97-AF65-F5344CB8AC3E}">
+        <p14:creationId xmlns:p14="http://schemas.microsoft.com/office/powerpoint/2010/main" val="886036096"/>
+      </p:ext>
+    </p:extLst>
+  </p:cSld>
+  <p:clrMapOvr>
+    <a:masterClrMapping/>
+  </p:clrMapOvr>
+</p:sld>
+</file>
+
+<file path=ppt/slides/slide4.xml><?xml version="1.0" encoding="utf-8"?>
+<p:sld xmlns:a="http://schemas.openxmlformats.org/drawingml/2006/main" xmlns:r="http://schemas.openxmlformats.org/officeDocument/2006/relationships" xmlns:p="http://schemas.openxmlformats.org/presentationml/2006/main">
+  <p:cSld>
+    <p:spTree>
+      <p:nvGrpSpPr>
+        <p:cNvPr id="1" name=""/>
+        <p:cNvGrpSpPr/>
+        <p:nvPr/>
+      </p:nvGrpSpPr>
+      <p:grpSpPr>
+        <a:xfrm>
+          <a:off x="0" y="0"/>
+          <a:ext cx="0" cy="0"/>
+          <a:chOff x="0" y="0"/>
+          <a:chExt cx="0" cy="0"/>
+        </a:xfrm>
+      </p:grpSpPr>
+      <p:sp>
+        <p:nvSpPr>
+          <p:cNvPr id="2" name="Title 1"/>
+          <p:cNvSpPr>
+            <a:spLocks noGrp="1"/>
+          </p:cNvSpPr>
+          <p:nvPr>
+            <p:ph type="title"/>
+          </p:nvPr>
+        </p:nvSpPr>
+        <p:spPr/>
+        <p:txBody>
+          <a:bodyPr/>
+          <a:lstStyle/>
+          <a:p>
+            <a:r>
+              <a:rPr lang="en-US" dirty="0" smtClean="0"/>
+              <a:t>Computational complexity</a:t>
+            </a:r>
+            <a:endParaRPr lang="en-US" dirty="0"/>
+          </a:p>
+        </p:txBody>
+      </p:sp>
+      <p:sp>
+        <p:nvSpPr>
+          <p:cNvPr id="3" name="Content Placeholder 2"/>
+          <p:cNvSpPr>
+            <a:spLocks noGrp="1"/>
+          </p:cNvSpPr>
+          <p:nvPr>
+            <p:ph idx="1"/>
+          </p:nvPr>
+        </p:nvSpPr>
+        <p:spPr/>
+        <p:txBody>
+          <a:bodyPr/>
+          <a:lstStyle/>
+          <a:p>
+            <a:pPr marL="342900" indent="-342900">
+              <a:buFont typeface="Arial"/>
+              <a:buChar char="•"/>
+            </a:pPr>
+            <a:r>
+              <a:rPr lang="en-US" dirty="0" smtClean="0"/>
+              <a:t>Certain computations can not be efficiently computed on a single machine</a:t>
+            </a:r>
+          </a:p>
+          <a:p>
+            <a:pPr marL="342900" indent="-342900">
+              <a:buFont typeface="Arial"/>
+              <a:buChar char="•"/>
+            </a:pPr>
+            <a:r>
+              <a:rPr lang="en-US" dirty="0" smtClean="0"/>
+              <a:t>Single-threaded code </a:t>
+            </a:r>
+            <a:r>
+              <a:rPr lang="en-US" dirty="0" smtClean="0">
+                <a:sym typeface="Wingdings"/>
+              </a:rPr>
+              <a:t> Multi-threaded code  Distributed code</a:t>
+            </a:r>
+            <a:endParaRPr lang="en-US" dirty="0" smtClean="0"/>
+          </a:p>
+          <a:p>
+            <a:pPr marL="342900" indent="-342900">
+              <a:buFont typeface="Arial"/>
+              <a:buChar char="•"/>
+            </a:pPr>
+            <a:r>
+              <a:rPr lang="en-US" dirty="0" smtClean="0"/>
+              <a:t>Code complexity increases drastically</a:t>
+            </a:r>
+          </a:p>
+          <a:p>
+            <a:pPr marL="342900" indent="-342900">
+              <a:buFont typeface="Arial"/>
+              <a:buChar char="•"/>
+            </a:pPr>
+            <a:endParaRPr lang="en-US" dirty="0" smtClean="0"/>
+          </a:p>
+          <a:p>
+            <a:r>
+              <a:rPr lang="en-US" dirty="0" smtClean="0"/>
+              <a:t>Related Technologies: </a:t>
+            </a:r>
+            <a:r>
+              <a:rPr lang="en-US" dirty="0" err="1" smtClean="0"/>
+              <a:t>MapReduce</a:t>
+            </a:r>
+            <a:r>
+              <a:rPr lang="en-US" dirty="0" smtClean="0"/>
+              <a:t>, </a:t>
+            </a:r>
+            <a:r>
+              <a:rPr lang="en-US" dirty="0" err="1" smtClean="0"/>
+              <a:t>OpenMP</a:t>
+            </a:r>
+            <a:r>
+              <a:rPr lang="en-US" dirty="0" smtClean="0"/>
+              <a:t>, MPI, CUDA, </a:t>
+            </a:r>
+            <a:r>
+              <a:rPr lang="en-US" dirty="0" err="1" smtClean="0"/>
+              <a:t>OpenCL</a:t>
+            </a:r>
+            <a:endParaRPr lang="en-US" dirty="0"/>
+          </a:p>
+        </p:txBody>
+      </p:sp>
+    </p:spTree>
+    <p:extLst>
+      <p:ext uri="{BB962C8B-B14F-4D97-AF65-F5344CB8AC3E}">
+        <p14:creationId xmlns:p14="http://schemas.microsoft.com/office/powerpoint/2010/main" val="3646871065"/>
+      </p:ext>
+    </p:extLst>
+  </p:cSld>
+  <p:clrMapOvr>
+    <a:masterClrMapping/>
+  </p:clrMapOvr>
+</p:sld>
+</file>
+
+<file path=ppt/slides/slide40.xml><?xml version="1.0" encoding="utf-8"?>
+<p:sld xmlns:a="http://schemas.openxmlformats.org/drawingml/2006/main" xmlns:r="http://schemas.openxmlformats.org/officeDocument/2006/relationships" xmlns:p="http://schemas.openxmlformats.org/presentationml/2006/main">
+  <p:cSld>
+    <p:spTree>
+      <p:nvGrpSpPr>
+        <p:cNvPr id="1" name=""/>
+        <p:cNvGrpSpPr/>
+        <p:nvPr/>
+      </p:nvGrpSpPr>
+      <p:grpSpPr>
+        <a:xfrm>
+          <a:off x="0" y="0"/>
+          <a:ext cx="0" cy="0"/>
+          <a:chOff x="0" y="0"/>
+          <a:chExt cx="0" cy="0"/>
+        </a:xfrm>
+      </p:grpSpPr>
+      <p:sp>
+        <p:nvSpPr>
+          <p:cNvPr id="2" name="Title 1"/>
+          <p:cNvSpPr>
+            <a:spLocks noGrp="1"/>
+          </p:cNvSpPr>
+          <p:nvPr>
+            <p:ph type="title"/>
+          </p:nvPr>
+        </p:nvSpPr>
+        <p:spPr/>
+        <p:txBody>
+          <a:bodyPr/>
+          <a:lstStyle/>
+          <a:p>
+            <a:r>
+              <a:rPr lang="en-US" dirty="0" smtClean="0"/>
+              <a:t>Cloud matrix </a:t>
+            </a:r>
+            <a:r>
+              <a:rPr lang="en-US" dirty="0" err="1" smtClean="0"/>
+              <a:t>mult</a:t>
+            </a:r>
+            <a:r>
+              <a:rPr lang="en-US" dirty="0" smtClean="0"/>
+              <a:t>. </a:t>
+            </a:r>
+            <a:endParaRPr lang="en-US" dirty="0"/>
+          </a:p>
+        </p:txBody>
+      </p:sp>
+      <p:pic>
+        <p:nvPicPr>
+          <p:cNvPr id="4" name="Content Placeholder 3" descr="ec2_gpu_matrix.pdf"/>
+          <p:cNvPicPr>
+            <a:picLocks noGrp="1" noChangeAspect="1"/>
+          </p:cNvPicPr>
+          <p:nvPr>
+            <p:ph idx="1"/>
+          </p:nvPr>
+        </p:nvPicPr>
+        <p:blipFill rotWithShape="1">
+          <a:blip r:embed="rId2">
+            <a:extLst>
+              <a:ext uri="{28A0092B-C50C-407E-A947-70E740481C1C}">
+                <a14:useLocalDpi xmlns:a14="http://schemas.microsoft.com/office/drawing/2010/main" val="0"/>
+              </a:ext>
+            </a:extLst>
+          </a:blip>
+          <a:srcRect t="-8051" b="-8051"/>
+          <a:stretch/>
+        </p:blipFill>
+        <p:spPr/>
+      </p:pic>
+    </p:spTree>
+    <p:extLst>
+      <p:ext uri="{BB962C8B-B14F-4D97-AF65-F5344CB8AC3E}">
+        <p14:creationId xmlns:p14="http://schemas.microsoft.com/office/powerpoint/2010/main" val="4219627522"/>
+      </p:ext>
+    </p:extLst>
+  </p:cSld>
+  <p:clrMapOvr>
+    <a:masterClrMapping/>
+  </p:clrMapOvr>
+</p:sld>
+</file>
+
+<file path=ppt/slides/slide41.xml><?xml version="1.0" encoding="utf-8"?>
+<p:sld xmlns:a="http://schemas.openxmlformats.org/drawingml/2006/main" xmlns:r="http://schemas.openxmlformats.org/officeDocument/2006/relationships" xmlns:p="http://schemas.openxmlformats.org/presentationml/2006/main">
+  <p:cSld>
+    <p:spTree>
+      <p:nvGrpSpPr>
+        <p:cNvPr id="1" name=""/>
+        <p:cNvGrpSpPr/>
+        <p:nvPr/>
+      </p:nvGrpSpPr>
+      <p:grpSpPr>
+        <a:xfrm>
+          <a:off x="0" y="0"/>
+          <a:ext cx="0" cy="0"/>
+          <a:chOff x="0" y="0"/>
+          <a:chExt cx="0" cy="0"/>
+        </a:xfrm>
+      </p:grpSpPr>
+      <p:sp>
+        <p:nvSpPr>
+          <p:cNvPr id="2" name="Title 1"/>
+          <p:cNvSpPr>
+            <a:spLocks noGrp="1"/>
+          </p:cNvSpPr>
+          <p:nvPr>
+            <p:ph type="title"/>
+          </p:nvPr>
+        </p:nvSpPr>
+        <p:spPr/>
+        <p:txBody>
+          <a:bodyPr/>
+          <a:lstStyle/>
+          <a:p>
+            <a:r>
+              <a:rPr lang="en-US" dirty="0" smtClean="0"/>
+              <a:t>Cloud </a:t>
+            </a:r>
+            <a:r>
+              <a:rPr lang="en-US" dirty="0" err="1" smtClean="0"/>
+              <a:t>mandelbrot</a:t>
+            </a:r>
+            <a:endParaRPr lang="en-US" dirty="0"/>
+          </a:p>
+        </p:txBody>
+      </p:sp>
+      <p:pic>
+        <p:nvPicPr>
+          <p:cNvPr id="6" name="Content Placeholder 5" descr="ec2_gpu_mandelbrot.pdf"/>
+          <p:cNvPicPr>
+            <a:picLocks noGrp="1" noChangeAspect="1"/>
+          </p:cNvPicPr>
+          <p:nvPr>
+            <p:ph idx="1"/>
+          </p:nvPr>
+        </p:nvPicPr>
+        <p:blipFill rotWithShape="1">
+          <a:blip r:embed="rId2">
+            <a:extLst>
+              <a:ext uri="{28A0092B-C50C-407E-A947-70E740481C1C}">
+                <a14:useLocalDpi xmlns:a14="http://schemas.microsoft.com/office/drawing/2010/main" val="0"/>
+              </a:ext>
+            </a:extLst>
+          </a:blip>
+          <a:srcRect t="-7010" b="-7010"/>
+          <a:stretch/>
+        </p:blipFill>
+        <p:spPr/>
+      </p:pic>
+    </p:spTree>
+    <p:extLst>
+      <p:ext uri="{BB962C8B-B14F-4D97-AF65-F5344CB8AC3E}">
+        <p14:creationId xmlns:p14="http://schemas.microsoft.com/office/powerpoint/2010/main" val="3245445482"/>
+      </p:ext>
+    </p:extLst>
+  </p:cSld>
+  <p:clrMapOvr>
+    <a:masterClrMapping/>
+  </p:clrMapOvr>
+</p:sld>
+</file>
+
+<file path=ppt/slides/slide42.xml><?xml version="1.0" encoding="utf-8"?>
+<p:sld xmlns:a="http://schemas.openxmlformats.org/drawingml/2006/main" xmlns:r="http://schemas.openxmlformats.org/officeDocument/2006/relationships" xmlns:p="http://schemas.openxmlformats.org/presentationml/2006/main">
+  <p:cSld>
+    <p:spTree>
+      <p:nvGrpSpPr>
+        <p:cNvPr id="1" name=""/>
+        <p:cNvGrpSpPr/>
+        <p:nvPr/>
+      </p:nvGrpSpPr>
+      <p:grpSpPr>
+        <a:xfrm>
+          <a:off x="0" y="0"/>
+          <a:ext cx="0" cy="0"/>
+          <a:chOff x="0" y="0"/>
+          <a:chExt cx="0" cy="0"/>
+        </a:xfrm>
+      </p:grpSpPr>
+      <p:sp>
+        <p:nvSpPr>
+          <p:cNvPr id="2" name="Title 1"/>
+          <p:cNvSpPr>
+            <a:spLocks noGrp="1"/>
+          </p:cNvSpPr>
+          <p:nvPr>
+            <p:ph type="title"/>
+          </p:nvPr>
+        </p:nvSpPr>
+        <p:spPr/>
+        <p:txBody>
+          <a:bodyPr/>
+          <a:lstStyle/>
+          <a:p>
+            <a:r>
+              <a:rPr lang="en-US" dirty="0" smtClean="0"/>
+              <a:t>Hybrid</a:t>
+            </a:r>
+            <a:endParaRPr lang="en-US" dirty="0"/>
+          </a:p>
+        </p:txBody>
+      </p:sp>
+      <p:pic>
+        <p:nvPicPr>
+          <p:cNvPr id="4" name="Content Placeholder 3" descr="hybrid.pdf"/>
+          <p:cNvPicPr>
+            <a:picLocks noGrp="1" noChangeAspect="1"/>
+          </p:cNvPicPr>
+          <p:nvPr>
+            <p:ph idx="1"/>
+          </p:nvPr>
+        </p:nvPicPr>
+        <p:blipFill rotWithShape="1">
+          <a:blip r:embed="rId2">
+            <a:extLst>
+              <a:ext uri="{28A0092B-C50C-407E-A947-70E740481C1C}">
+                <a14:useLocalDpi xmlns:a14="http://schemas.microsoft.com/office/drawing/2010/main" val="0"/>
+              </a:ext>
+            </a:extLst>
+          </a:blip>
+          <a:srcRect l="-82" r="-82"/>
+          <a:stretch/>
+        </p:blipFill>
+        <p:spPr/>
+      </p:pic>
+    </p:spTree>
+    <p:extLst>
+      <p:ext uri="{BB962C8B-B14F-4D97-AF65-F5344CB8AC3E}">
+        <p14:creationId xmlns:p14="http://schemas.microsoft.com/office/powerpoint/2010/main" val="2148316696"/>
+      </p:ext>
+    </p:extLst>
+  </p:cSld>
+  <p:clrMapOvr>
+    <a:masterClrMapping/>
+  </p:clrMapOvr>
+</p:sld>
+</file>
+
+<file path=ppt/slides/slide43.xml><?xml version="1.0" encoding="utf-8"?>
+<p:sld xmlns:a="http://schemas.openxmlformats.org/drawingml/2006/main" xmlns:r="http://schemas.openxmlformats.org/officeDocument/2006/relationships" xmlns:p="http://schemas.openxmlformats.org/presentationml/2006/main">
+  <p:cSld>
+    <p:spTree>
+      <p:nvGrpSpPr>
+        <p:cNvPr id="1" name=""/>
+        <p:cNvGrpSpPr/>
+        <p:nvPr/>
+      </p:nvGrpSpPr>
+      <p:grpSpPr>
+        <a:xfrm>
+          <a:off x="0" y="0"/>
+          <a:ext cx="0" cy="0"/>
+          <a:chOff x="0" y="0"/>
+          <a:chExt cx="0" cy="0"/>
+        </a:xfrm>
+      </p:grpSpPr>
+      <p:sp>
+        <p:nvSpPr>
+          <p:cNvPr id="2" name="Title 1"/>
+          <p:cNvSpPr>
+            <a:spLocks noGrp="1"/>
+          </p:cNvSpPr>
+          <p:nvPr>
+            <p:ph type="title"/>
+          </p:nvPr>
+        </p:nvSpPr>
+        <p:spPr/>
+        <p:txBody>
+          <a:bodyPr/>
+          <a:lstStyle/>
+          <a:p>
+            <a:r>
+              <a:rPr lang="en-US" dirty="0" smtClean="0"/>
+              <a:t>Hybrid matrix </a:t>
+            </a:r>
+            <a:r>
+              <a:rPr lang="en-US" dirty="0" err="1" smtClean="0"/>
+              <a:t>mult</a:t>
+            </a:r>
+            <a:r>
+              <a:rPr lang="en-US" dirty="0" smtClean="0"/>
+              <a:t>.</a:t>
+            </a:r>
+            <a:endParaRPr lang="en-US" dirty="0"/>
+          </a:p>
+        </p:txBody>
+      </p:sp>
+      <p:pic>
+        <p:nvPicPr>
+          <p:cNvPr id="5" name="Content Placeholder 4" descr="hybrid_matrix.pdf"/>
+          <p:cNvPicPr>
+            <a:picLocks noGrp="1" noChangeAspect="1"/>
+          </p:cNvPicPr>
+          <p:nvPr>
+            <p:ph idx="1"/>
+          </p:nvPr>
+        </p:nvPicPr>
+        <p:blipFill rotWithShape="1">
+          <a:blip r:embed="rId2">
+            <a:extLst>
+              <a:ext uri="{28A0092B-C50C-407E-A947-70E740481C1C}">
+                <a14:useLocalDpi xmlns:a14="http://schemas.microsoft.com/office/drawing/2010/main" val="0"/>
+              </a:ext>
+            </a:extLst>
+          </a:blip>
+          <a:srcRect t="-670" b="-670"/>
+          <a:stretch/>
+        </p:blipFill>
+        <p:spPr/>
+      </p:pic>
+    </p:spTree>
+    <p:extLst>
+      <p:ext uri="{BB962C8B-B14F-4D97-AF65-F5344CB8AC3E}">
+        <p14:creationId xmlns:p14="http://schemas.microsoft.com/office/powerpoint/2010/main" val="2962685441"/>
+      </p:ext>
+    </p:extLst>
+  </p:cSld>
+  <p:clrMapOvr>
+    <a:masterClrMapping/>
+  </p:clrMapOvr>
+</p:sld>
+</file>
+
+<file path=ppt/slides/slide44.xml><?xml version="1.0" encoding="utf-8"?>
+<p:sld xmlns:a="http://schemas.openxmlformats.org/drawingml/2006/main" xmlns:r="http://schemas.openxmlformats.org/officeDocument/2006/relationships" xmlns:p="http://schemas.openxmlformats.org/presentationml/2006/main">
+  <p:cSld>
+    <p:spTree>
+      <p:nvGrpSpPr>
+        <p:cNvPr id="1" name=""/>
+        <p:cNvGrpSpPr/>
+        <p:nvPr/>
+      </p:nvGrpSpPr>
+      <p:grpSpPr>
+        <a:xfrm>
+          <a:off x="0" y="0"/>
+          <a:ext cx="0" cy="0"/>
+          <a:chOff x="0" y="0"/>
+          <a:chExt cx="0" cy="0"/>
+        </a:xfrm>
+      </p:grpSpPr>
+      <p:sp>
+        <p:nvSpPr>
+          <p:cNvPr id="2" name="Title 1"/>
+          <p:cNvSpPr>
+            <a:spLocks noGrp="1"/>
+          </p:cNvSpPr>
+          <p:nvPr>
+            <p:ph type="title"/>
+          </p:nvPr>
+        </p:nvSpPr>
+        <p:spPr/>
+        <p:txBody>
+          <a:bodyPr/>
+          <a:lstStyle/>
+          <a:p>
+            <a:r>
+              <a:rPr lang="en-US" dirty="0" smtClean="0"/>
+              <a:t>Hybrid </a:t>
+            </a:r>
+            <a:r>
+              <a:rPr lang="en-US" dirty="0" err="1" smtClean="0"/>
+              <a:t>mandelbrot</a:t>
+            </a:r>
+            <a:endParaRPr lang="en-US" dirty="0"/>
+          </a:p>
+        </p:txBody>
+      </p:sp>
+      <p:pic>
+        <p:nvPicPr>
+          <p:cNvPr id="4" name="Content Placeholder 3" descr="hybrid_mandelbrot.pdf"/>
+          <p:cNvPicPr>
+            <a:picLocks noGrp="1" noChangeAspect="1"/>
+          </p:cNvPicPr>
+          <p:nvPr>
+            <p:ph idx="1"/>
+          </p:nvPr>
+        </p:nvPicPr>
+        <p:blipFill rotWithShape="1">
+          <a:blip r:embed="rId2">
+            <a:extLst>
+              <a:ext uri="{28A0092B-C50C-407E-A947-70E740481C1C}">
+                <a14:useLocalDpi xmlns:a14="http://schemas.microsoft.com/office/drawing/2010/main" val="0"/>
+              </a:ext>
+            </a:extLst>
+          </a:blip>
+          <a:srcRect l="-1244" r="-1244"/>
+          <a:stretch/>
+        </p:blipFill>
+        <p:spPr/>
+      </p:pic>
+    </p:spTree>
+    <p:extLst>
+      <p:ext uri="{BB962C8B-B14F-4D97-AF65-F5344CB8AC3E}">
+        <p14:creationId xmlns:p14="http://schemas.microsoft.com/office/powerpoint/2010/main" val="2722517686"/>
+      </p:ext>
+    </p:extLst>
+  </p:cSld>
+  <p:clrMapOvr>
+    <a:masterClrMapping/>
+  </p:clrMapOvr>
+</p:sld>
+</file>
+
+<file path=ppt/slides/slide45.xml><?xml version="1.0" encoding="utf-8"?>
+<p:sld xmlns:a="http://schemas.openxmlformats.org/drawingml/2006/main" xmlns:r="http://schemas.openxmlformats.org/officeDocument/2006/relationships" xmlns:p="http://schemas.openxmlformats.org/presentationml/2006/main">
+  <p:cSld>
+    <p:spTree>
+      <p:nvGrpSpPr>
+        <p:cNvPr id="1" name=""/>
+        <p:cNvGrpSpPr/>
+        <p:nvPr/>
+      </p:nvGrpSpPr>
+      <p:grpSpPr>
+        <a:xfrm>
+          <a:off x="0" y="0"/>
+          <a:ext cx="0" cy="0"/>
+          <a:chOff x="0" y="0"/>
+          <a:chExt cx="0" cy="0"/>
+        </a:xfrm>
+      </p:grpSpPr>
+      <p:sp>
+        <p:nvSpPr>
+          <p:cNvPr id="2" name="Title 1"/>
+          <p:cNvSpPr>
+            <a:spLocks noGrp="1"/>
+          </p:cNvSpPr>
+          <p:nvPr>
+            <p:ph type="title"/>
+          </p:nvPr>
+        </p:nvSpPr>
+        <p:spPr/>
+        <p:txBody>
+          <a:bodyPr/>
+          <a:lstStyle/>
+          <a:p>
+            <a:r>
+              <a:rPr lang="en-US" dirty="0" smtClean="0"/>
+              <a:t>Hybrid job Suite scheduling</a:t>
+            </a:r>
+            <a:endParaRPr lang="en-US" dirty="0"/>
+          </a:p>
+        </p:txBody>
+      </p:sp>
+      <p:pic>
+        <p:nvPicPr>
+          <p:cNvPr id="14" name="Content Placeholder 13" descr="hybrid_full_compare.pdf"/>
+          <p:cNvPicPr>
+            <a:picLocks noGrp="1" noChangeAspect="1"/>
+          </p:cNvPicPr>
+          <p:nvPr>
+            <p:ph idx="1"/>
+          </p:nvPr>
+        </p:nvPicPr>
+        <p:blipFill rotWithShape="1">
+          <a:blip r:embed="rId2">
+            <a:extLst>
+              <a:ext uri="{28A0092B-C50C-407E-A947-70E740481C1C}">
+                <a14:useLocalDpi xmlns:a14="http://schemas.microsoft.com/office/drawing/2010/main" val="0"/>
+              </a:ext>
+            </a:extLst>
+          </a:blip>
+          <a:srcRect t="-8549" b="-8549"/>
+          <a:stretch/>
+        </p:blipFill>
+        <p:spPr/>
+      </p:pic>
+    </p:spTree>
+    <p:extLst>
+      <p:ext uri="{BB962C8B-B14F-4D97-AF65-F5344CB8AC3E}">
+        <p14:creationId xmlns:p14="http://schemas.microsoft.com/office/powerpoint/2010/main" val="645503609"/>
+      </p:ext>
+    </p:extLst>
+  </p:cSld>
+  <p:clrMapOvr>
+    <a:masterClrMapping/>
+  </p:clrMapOvr>
+</p:sld>
+</file>
+
+<file path=ppt/slides/slide46.xml><?xml version="1.0" encoding="utf-8"?>
+<p:sld xmlns:a="http://schemas.openxmlformats.org/drawingml/2006/main" xmlns:r="http://schemas.openxmlformats.org/officeDocument/2006/relationships" xmlns:p="http://schemas.openxmlformats.org/presentationml/2006/main">
+  <p:cSld>
+    <p:spTree>
+      <p:nvGrpSpPr>
+        <p:cNvPr id="1" name=""/>
+        <p:cNvGrpSpPr/>
+        <p:nvPr/>
+      </p:nvGrpSpPr>
+      <p:grpSpPr>
+        <a:xfrm>
+          <a:off x="0" y="0"/>
+          <a:ext cx="0" cy="0"/>
+          <a:chOff x="0" y="0"/>
+          <a:chExt cx="0" cy="0"/>
+        </a:xfrm>
+      </p:grpSpPr>
+      <p:sp>
+        <p:nvSpPr>
+          <p:cNvPr id="2" name="Title 1"/>
+          <p:cNvSpPr>
+            <a:spLocks noGrp="1"/>
+          </p:cNvSpPr>
+          <p:nvPr>
+            <p:ph type="title"/>
+          </p:nvPr>
+        </p:nvSpPr>
+        <p:spPr/>
+        <p:txBody>
+          <a:bodyPr/>
+          <a:lstStyle/>
+          <a:p>
+            <a:r>
+              <a:rPr lang="en-US" dirty="0" smtClean="0"/>
               <a:t>Future work</a:t>
             </a:r>
             <a:endParaRPr lang="en-US" dirty="0"/>
@@ -7872,7 +8734,7 @@
 </p:sld>
 </file>
 
-<file path=ppt/slides/slide39.xml><?xml version="1.0" encoding="utf-8"?>
+<file path=ppt/slides/slide47.xml><?xml version="1.0" encoding="utf-8"?>
 <p:sld xmlns:a="http://schemas.openxmlformats.org/drawingml/2006/main" xmlns:r="http://schemas.openxmlformats.org/officeDocument/2006/relationships" xmlns:p="http://schemas.openxmlformats.org/presentationml/2006/main">
   <p:cSld>
     <p:spTree>
@@ -7985,147 +8847,7 @@
 </p:sld>
 </file>
 
-<file path=ppt/slides/slide4.xml><?xml version="1.0" encoding="utf-8"?>
-<p:sld xmlns:a="http://schemas.openxmlformats.org/drawingml/2006/main" xmlns:r="http://schemas.openxmlformats.org/officeDocument/2006/relationships" xmlns:p="http://schemas.openxmlformats.org/presentationml/2006/main">
-  <p:cSld>
-    <p:spTree>
-      <p:nvGrpSpPr>
-        <p:cNvPr id="1" name=""/>
-        <p:cNvGrpSpPr/>
-        <p:nvPr/>
-      </p:nvGrpSpPr>
-      <p:grpSpPr>
-        <a:xfrm>
-          <a:off x="0" y="0"/>
-          <a:ext cx="0" cy="0"/>
-          <a:chOff x="0" y="0"/>
-          <a:chExt cx="0" cy="0"/>
-        </a:xfrm>
-      </p:grpSpPr>
-      <p:sp>
-        <p:nvSpPr>
-          <p:cNvPr id="2" name="Title 1"/>
-          <p:cNvSpPr>
-            <a:spLocks noGrp="1"/>
-          </p:cNvSpPr>
-          <p:nvPr>
-            <p:ph type="title"/>
-          </p:nvPr>
-        </p:nvSpPr>
-        <p:spPr/>
-        <p:txBody>
-          <a:bodyPr/>
-          <a:lstStyle/>
-          <a:p>
-            <a:r>
-              <a:rPr lang="en-US" dirty="0" smtClean="0"/>
-              <a:t>Computational complexity</a:t>
-            </a:r>
-            <a:endParaRPr lang="en-US" dirty="0"/>
-          </a:p>
-        </p:txBody>
-      </p:sp>
-      <p:sp>
-        <p:nvSpPr>
-          <p:cNvPr id="3" name="Content Placeholder 2"/>
-          <p:cNvSpPr>
-            <a:spLocks noGrp="1"/>
-          </p:cNvSpPr>
-          <p:nvPr>
-            <p:ph idx="1"/>
-          </p:nvPr>
-        </p:nvSpPr>
-        <p:spPr/>
-        <p:txBody>
-          <a:bodyPr/>
-          <a:lstStyle/>
-          <a:p>
-            <a:pPr marL="342900" indent="-342900">
-              <a:buFont typeface="Arial"/>
-              <a:buChar char="•"/>
-            </a:pPr>
-            <a:r>
-              <a:rPr lang="en-US" dirty="0" smtClean="0"/>
-              <a:t>Certain computations can not be efficiently computed on a single machine</a:t>
-            </a:r>
-          </a:p>
-          <a:p>
-            <a:pPr marL="342900" indent="-342900">
-              <a:buFont typeface="Arial"/>
-              <a:buChar char="•"/>
-            </a:pPr>
-            <a:r>
-              <a:rPr lang="en-US" dirty="0" smtClean="0"/>
-              <a:t>Single-threaded code </a:t>
-            </a:r>
-            <a:r>
-              <a:rPr lang="en-US" dirty="0" smtClean="0">
-                <a:sym typeface="Wingdings"/>
-              </a:rPr>
-              <a:t> Multi-threaded code  Distributed code</a:t>
-            </a:r>
-            <a:endParaRPr lang="en-US" dirty="0" smtClean="0"/>
-          </a:p>
-          <a:p>
-            <a:pPr marL="342900" indent="-342900">
-              <a:buFont typeface="Arial"/>
-              <a:buChar char="•"/>
-            </a:pPr>
-            <a:r>
-              <a:rPr lang="en-US" dirty="0" smtClean="0"/>
-              <a:t>Code complexity increases drastically</a:t>
-            </a:r>
-          </a:p>
-          <a:p>
-            <a:pPr marL="342900" indent="-342900">
-              <a:buFont typeface="Arial"/>
-              <a:buChar char="•"/>
-            </a:pPr>
-            <a:endParaRPr lang="en-US" dirty="0" smtClean="0"/>
-          </a:p>
-          <a:p>
-            <a:r>
-              <a:rPr lang="en-US" dirty="0" smtClean="0"/>
-              <a:t>Related Technologies: </a:t>
-            </a:r>
-            <a:r>
-              <a:rPr lang="en-US" dirty="0" err="1" smtClean="0"/>
-              <a:t>MapReduce</a:t>
-            </a:r>
-            <a:r>
-              <a:rPr lang="en-US" dirty="0" smtClean="0"/>
-              <a:t>, </a:t>
-            </a:r>
-            <a:r>
-              <a:rPr lang="en-US" dirty="0" err="1" smtClean="0"/>
-              <a:t>OpenMP</a:t>
-            </a:r>
-            <a:r>
-              <a:rPr lang="en-US" dirty="0" smtClean="0"/>
-              <a:t>, MPI, CUDA, </a:t>
-            </a:r>
-            <a:r>
-              <a:rPr lang="en-US" dirty="0" err="1" smtClean="0"/>
-              <a:t>OpenCL</a:t>
-            </a:r>
-            <a:endParaRPr lang="en-US" dirty="0"/>
-          </a:p>
-        </p:txBody>
-      </p:sp>
-    </p:spTree>
-    <p:extLst>
-      <p:ext uri="{BB962C8B-B14F-4D97-AF65-F5344CB8AC3E}">
-        <p14:creationId xmlns:p14="http://schemas.microsoft.com/office/powerpoint/2010/main" val="3646871065"/>
-      </p:ext>
-    </p:extLst>
-  </p:cSld>
-  <p:clrMapOvr>
-    <a:masterClrMapping/>
-  </p:clrMapOvr>
-</p:sld>
-</file>
-
-<file path=ppt/slides/slide40.xml><?xml version="1.0" encoding="utf-8"?>
+<file path=ppt/slides/slide48.xml><?xml version="1.0" encoding="utf-8"?>
 <p:sld xmlns:a="http://schemas.openxmlformats.org/drawingml/2006/main" xmlns:r="http://schemas.openxmlformats.org/officeDocument/2006/relationships" xmlns:p="http://schemas.openxmlformats.org/presentationml/2006/main">
   <p:cSld>
     <p:spTree>
@@ -8255,7 +8977,7 @@
 </p:sld>
 </file>
 
-<file path=ppt/slides/slide41.xml><?xml version="1.0" encoding="utf-8"?>
+<file path=ppt/slides/slide49.xml><?xml version="1.0" encoding="utf-8"?>
 <p:sld xmlns:a="http://schemas.openxmlformats.org/drawingml/2006/main" xmlns:r="http://schemas.openxmlformats.org/officeDocument/2006/relationships" xmlns:p="http://schemas.openxmlformats.org/presentationml/2006/main">
   <p:cSld>
     <p:spTree>
@@ -8318,412 +9040,6 @@
     <p:extLst>
       <p:ext uri="{BB962C8B-B14F-4D97-AF65-F5344CB8AC3E}">
         <p14:creationId xmlns:p14="http://schemas.microsoft.com/office/powerpoint/2010/main" val="653152721"/>
-      </p:ext>
-    </p:extLst>
-  </p:cSld>
-  <p:clrMapOvr>
-    <a:masterClrMapping/>
-  </p:clrMapOvr>
-</p:sld>
-</file>
-
-<file path=ppt/slides/slide42.xml><?xml version="1.0" encoding="utf-8"?>
-<p:sld xmlns:a="http://schemas.openxmlformats.org/drawingml/2006/main" xmlns:r="http://schemas.openxmlformats.org/officeDocument/2006/relationships" xmlns:p="http://schemas.openxmlformats.org/presentationml/2006/main">
-  <p:cSld>
-    <p:spTree>
-      <p:nvGrpSpPr>
-        <p:cNvPr id="1" name=""/>
-        <p:cNvGrpSpPr/>
-        <p:nvPr/>
-      </p:nvGrpSpPr>
-      <p:grpSpPr>
-        <a:xfrm>
-          <a:off x="0" y="0"/>
-          <a:ext cx="0" cy="0"/>
-          <a:chOff x="0" y="0"/>
-          <a:chExt cx="0" cy="0"/>
-        </a:xfrm>
-      </p:grpSpPr>
-      <p:sp>
-        <p:nvSpPr>
-          <p:cNvPr id="4" name="Title 3"/>
-          <p:cNvSpPr>
-            <a:spLocks noGrp="1"/>
-          </p:cNvSpPr>
-          <p:nvPr>
-            <p:ph type="title"/>
-          </p:nvPr>
-        </p:nvSpPr>
-        <p:spPr/>
-        <p:txBody>
-          <a:bodyPr/>
-          <a:lstStyle/>
-          <a:p>
-            <a:r>
-              <a:rPr lang="en-US" dirty="0" smtClean="0"/>
-              <a:t>limitations</a:t>
-            </a:r>
-            <a:endParaRPr lang="en-US" dirty="0"/>
-          </a:p>
-        </p:txBody>
-      </p:sp>
-      <p:sp>
-        <p:nvSpPr>
-          <p:cNvPr id="5" name="Content Placeholder 4"/>
-          <p:cNvSpPr>
-            <a:spLocks noGrp="1"/>
-          </p:cNvSpPr>
-          <p:nvPr>
-            <p:ph idx="1"/>
-          </p:nvPr>
-        </p:nvSpPr>
-        <p:spPr/>
-        <p:txBody>
-          <a:bodyPr/>
-          <a:lstStyle/>
-          <a:p>
-            <a:pPr marL="342900" indent="-342900">
-              <a:buFont typeface="Arial"/>
-              <a:buChar char="•"/>
-            </a:pPr>
-            <a:r>
-              <a:rPr lang="en-US" dirty="0" smtClean="0"/>
-              <a:t>Network connection major bottleneck</a:t>
-            </a:r>
-          </a:p>
-          <a:p>
-            <a:pPr marL="342900" indent="-342900">
-              <a:buFont typeface="Arial"/>
-              <a:buChar char="•"/>
-            </a:pPr>
-            <a:r>
-              <a:rPr lang="en-US" dirty="0" smtClean="0"/>
-              <a:t>Limitations of </a:t>
-            </a:r>
-            <a:r>
-              <a:rPr lang="en-US" dirty="0" err="1" smtClean="0"/>
-              <a:t>Aparapi</a:t>
-            </a:r>
-            <a:endParaRPr lang="en-US" dirty="0" smtClean="0"/>
-          </a:p>
-          <a:p>
-            <a:pPr marL="800100" lvl="1" indent="-342900">
-              <a:buFont typeface="Arial"/>
-              <a:buChar char="•"/>
-            </a:pPr>
-            <a:r>
-              <a:rPr lang="en-US" dirty="0" smtClean="0"/>
-              <a:t>Code translation</a:t>
-            </a:r>
-          </a:p>
-          <a:p>
-            <a:pPr marL="800100" lvl="1" indent="-342900">
-              <a:buFont typeface="Arial"/>
-              <a:buChar char="•"/>
-            </a:pPr>
-            <a:r>
-              <a:rPr lang="en-US" dirty="0" smtClean="0"/>
-              <a:t>Device support</a:t>
-            </a:r>
-          </a:p>
-          <a:p>
-            <a:pPr marL="342900" indent="-342900">
-              <a:buFont typeface="Arial"/>
-              <a:buChar char="•"/>
-            </a:pPr>
-            <a:r>
-              <a:rPr lang="en-US" dirty="0" err="1" smtClean="0"/>
-              <a:t>OpenCL</a:t>
-            </a:r>
-            <a:r>
-              <a:rPr lang="en-US" dirty="0" smtClean="0"/>
-              <a:t> device feature set currently ignored by scheduling</a:t>
-            </a:r>
-          </a:p>
-          <a:p>
-            <a:pPr marL="342900" indent="-342900">
-              <a:buFont typeface="Arial"/>
-              <a:buChar char="•"/>
-            </a:pPr>
-            <a:r>
-              <a:rPr lang="en-US" dirty="0" smtClean="0"/>
-              <a:t>Memory may become bottleneck when many jobs are executed in parallel</a:t>
-            </a:r>
-          </a:p>
-          <a:p>
-            <a:pPr marL="342900" indent="-342900">
-              <a:buFont typeface="Arial"/>
-              <a:buChar char="•"/>
-            </a:pPr>
-            <a:endParaRPr lang="en-US" dirty="0"/>
-          </a:p>
-        </p:txBody>
-      </p:sp>
-    </p:spTree>
-    <p:extLst>
-      <p:ext uri="{BB962C8B-B14F-4D97-AF65-F5344CB8AC3E}">
-        <p14:creationId xmlns:p14="http://schemas.microsoft.com/office/powerpoint/2010/main" val="3896321887"/>
-      </p:ext>
-    </p:extLst>
-  </p:cSld>
-  <p:clrMapOvr>
-    <a:masterClrMapping/>
-  </p:clrMapOvr>
-</p:sld>
-</file>
-
-<file path=ppt/slides/slide43.xml><?xml version="1.0" encoding="utf-8"?>
-<p:sld xmlns:a="http://schemas.openxmlformats.org/drawingml/2006/main" xmlns:r="http://schemas.openxmlformats.org/officeDocument/2006/relationships" xmlns:p="http://schemas.openxmlformats.org/presentationml/2006/main">
-  <p:cSld>
-    <p:spTree>
-      <p:nvGrpSpPr>
-        <p:cNvPr id="1" name=""/>
-        <p:cNvGrpSpPr/>
-        <p:nvPr/>
-      </p:nvGrpSpPr>
-      <p:grpSpPr>
-        <a:xfrm>
-          <a:off x="0" y="0"/>
-          <a:ext cx="0" cy="0"/>
-          <a:chOff x="0" y="0"/>
-          <a:chExt cx="0" cy="0"/>
-        </a:xfrm>
-      </p:grpSpPr>
-      <p:sp>
-        <p:nvSpPr>
-          <p:cNvPr id="2" name="Title 1"/>
-          <p:cNvSpPr>
-            <a:spLocks noGrp="1"/>
-          </p:cNvSpPr>
-          <p:nvPr>
-            <p:ph type="title"/>
-          </p:nvPr>
-        </p:nvSpPr>
-        <p:spPr/>
-        <p:txBody>
-          <a:bodyPr/>
-          <a:lstStyle/>
-          <a:p>
-            <a:r>
-              <a:rPr lang="en-US" dirty="0" smtClean="0"/>
-              <a:t>Achievements</a:t>
-            </a:r>
-            <a:endParaRPr lang="en-US" dirty="0"/>
-          </a:p>
-        </p:txBody>
-      </p:sp>
-      <p:sp>
-        <p:nvSpPr>
-          <p:cNvPr id="3" name="Content Placeholder 2"/>
-          <p:cNvSpPr>
-            <a:spLocks noGrp="1"/>
-          </p:cNvSpPr>
-          <p:nvPr>
-            <p:ph idx="1"/>
-          </p:nvPr>
-        </p:nvSpPr>
-        <p:spPr/>
-        <p:txBody>
-          <a:bodyPr/>
-          <a:lstStyle/>
-          <a:p>
-            <a:pPr marL="342900" indent="-342900">
-              <a:buFont typeface="Arial"/>
-              <a:buChar char="•"/>
-            </a:pPr>
-            <a:r>
-              <a:rPr lang="en-US" dirty="0" smtClean="0"/>
-              <a:t>Distributed computations on heterogeneous clusters</a:t>
-            </a:r>
-          </a:p>
-          <a:p>
-            <a:pPr marL="342900" indent="-342900">
-              <a:buFont typeface="Arial"/>
-              <a:buChar char="•"/>
-            </a:pPr>
-            <a:r>
-              <a:rPr lang="en-US" dirty="0" smtClean="0"/>
-              <a:t>Flat learning curve and little code necessary</a:t>
-            </a:r>
-          </a:p>
-          <a:p>
-            <a:pPr marL="342900" indent="-342900">
-              <a:buFont typeface="Arial"/>
-              <a:buChar char="•"/>
-            </a:pPr>
-            <a:r>
-              <a:rPr lang="en-US" dirty="0" smtClean="0"/>
-              <a:t>Cluster size can be dynamically increased by cloud resources</a:t>
-            </a:r>
-          </a:p>
-          <a:p>
-            <a:pPr marL="342900" indent="-342900">
-              <a:buFont typeface="Arial"/>
-              <a:buChar char="•"/>
-            </a:pPr>
-            <a:r>
-              <a:rPr lang="en-US" dirty="0" smtClean="0"/>
-              <a:t>Scheduling architecture adaptable to various use cases</a:t>
-            </a:r>
-          </a:p>
-          <a:p>
-            <a:pPr marL="342900" indent="-342900">
-              <a:buFont typeface="Arial"/>
-              <a:buChar char="•"/>
-            </a:pPr>
-            <a:r>
-              <a:rPr lang="en-US" dirty="0" smtClean="0"/>
-              <a:t>Small code base (less than 1500 Java LOC)</a:t>
-            </a:r>
-          </a:p>
-          <a:p>
-            <a:pPr marL="342900" indent="-342900">
-              <a:buFont typeface="Arial"/>
-              <a:buChar char="•"/>
-            </a:pPr>
-            <a:endParaRPr lang="en-US" dirty="0" smtClean="0"/>
-          </a:p>
-          <a:p>
-            <a:endParaRPr lang="en-US" dirty="0"/>
-          </a:p>
-        </p:txBody>
-      </p:sp>
-    </p:spTree>
-    <p:extLst>
-      <p:ext uri="{BB962C8B-B14F-4D97-AF65-F5344CB8AC3E}">
-        <p14:creationId xmlns:p14="http://schemas.microsoft.com/office/powerpoint/2010/main" val="1678207550"/>
-      </p:ext>
-    </p:extLst>
-  </p:cSld>
-  <p:clrMapOvr>
-    <a:masterClrMapping/>
-  </p:clrMapOvr>
-</p:sld>
-</file>
-
-<file path=ppt/slides/slide44.xml><?xml version="1.0" encoding="utf-8"?>
-<p:sld xmlns:a="http://schemas.openxmlformats.org/drawingml/2006/main" xmlns:r="http://schemas.openxmlformats.org/officeDocument/2006/relationships" xmlns:p="http://schemas.openxmlformats.org/presentationml/2006/main">
-  <p:cSld>
-    <p:spTree>
-      <p:nvGrpSpPr>
-        <p:cNvPr id="1" name=""/>
-        <p:cNvGrpSpPr/>
-        <p:nvPr/>
-      </p:nvGrpSpPr>
-      <p:grpSpPr>
-        <a:xfrm>
-          <a:off x="0" y="0"/>
-          <a:ext cx="0" cy="0"/>
-          <a:chOff x="0" y="0"/>
-          <a:chExt cx="0" cy="0"/>
-        </a:xfrm>
-      </p:grpSpPr>
-      <p:sp>
-        <p:nvSpPr>
-          <p:cNvPr id="6" name="Title 5"/>
-          <p:cNvSpPr>
-            <a:spLocks noGrp="1"/>
-          </p:cNvSpPr>
-          <p:nvPr>
-            <p:ph type="title"/>
-          </p:nvPr>
-        </p:nvSpPr>
-        <p:spPr/>
-        <p:txBody>
-          <a:bodyPr/>
-          <a:lstStyle/>
-          <a:p>
-            <a:r>
-              <a:rPr lang="en-US" dirty="0" smtClean="0"/>
-              <a:t>Source codes</a:t>
-            </a:r>
-            <a:endParaRPr lang="en-US" dirty="0"/>
-          </a:p>
-        </p:txBody>
-      </p:sp>
-      <p:sp>
-        <p:nvSpPr>
-          <p:cNvPr id="7" name="Content Placeholder 6"/>
-          <p:cNvSpPr>
-            <a:spLocks noGrp="1"/>
-          </p:cNvSpPr>
-          <p:nvPr>
-            <p:ph idx="1"/>
-          </p:nvPr>
-        </p:nvSpPr>
-        <p:spPr/>
-        <p:txBody>
-          <a:bodyPr/>
-          <a:lstStyle/>
-          <a:p>
-            <a:r>
-              <a:rPr lang="en-US" dirty="0">
-                <a:hlinkClick r:id="rId2"/>
-              </a:rPr>
-              <a:t>https://github.com/florianroesler/</a:t>
-            </a:r>
-            <a:r>
-              <a:rPr lang="en-US" dirty="0" smtClean="0">
-                <a:hlinkClick r:id="rId2"/>
-              </a:rPr>
-              <a:t>dopencl</a:t>
-            </a:r>
-            <a:endParaRPr lang="en-US" dirty="0" smtClean="0"/>
-          </a:p>
-          <a:p>
-            <a:r>
-              <a:rPr lang="en-US" dirty="0">
-                <a:hlinkClick r:id="rId3"/>
-              </a:rPr>
-              <a:t>https://github.com/florianroesler/</a:t>
-            </a:r>
-            <a:r>
-              <a:rPr lang="en-US" dirty="0" smtClean="0">
-                <a:hlinkClick r:id="rId3"/>
-              </a:rPr>
-              <a:t>aparapi</a:t>
-            </a:r>
-            <a:endParaRPr lang="en-US" dirty="0" smtClean="0"/>
-          </a:p>
-          <a:p>
-            <a:r>
-              <a:rPr lang="en-US" dirty="0">
-                <a:hlinkClick r:id="rId4"/>
-              </a:rPr>
-              <a:t>https://github.com/florianroesler/</a:t>
-            </a:r>
-            <a:r>
-              <a:rPr lang="en-US" dirty="0" smtClean="0">
-                <a:hlinkClick r:id="rId4"/>
-              </a:rPr>
-              <a:t>dynamopencl</a:t>
-            </a:r>
-            <a:endParaRPr lang="en-US" dirty="0" smtClean="0"/>
-          </a:p>
-          <a:p>
-            <a:r>
-              <a:rPr lang="en-US" dirty="0">
-                <a:hlinkClick r:id="rId5"/>
-              </a:rPr>
-              <a:t>https://github.com/florianroesler/dynamo-</a:t>
-            </a:r>
-            <a:r>
-              <a:rPr lang="en-US" dirty="0" smtClean="0">
-                <a:hlinkClick r:id="rId5"/>
-              </a:rPr>
-              <a:t>server</a:t>
-            </a:r>
-            <a:endParaRPr lang="en-US" dirty="0" smtClean="0"/>
-          </a:p>
-          <a:p>
-            <a:endParaRPr lang="en-US" dirty="0"/>
-          </a:p>
-        </p:txBody>
-      </p:sp>
-    </p:spTree>
-    <p:extLst>
-      <p:ext uri="{BB962C8B-B14F-4D97-AF65-F5344CB8AC3E}">
-        <p14:creationId xmlns:p14="http://schemas.microsoft.com/office/powerpoint/2010/main" val="2512713343"/>
       </p:ext>
     </p:extLst>
   </p:cSld>
@@ -8899,6 +9215,412 @@
 </p:sld>
 </file>
 
+<file path=ppt/slides/slide50.xml><?xml version="1.0" encoding="utf-8"?>
+<p:sld xmlns:a="http://schemas.openxmlformats.org/drawingml/2006/main" xmlns:r="http://schemas.openxmlformats.org/officeDocument/2006/relationships" xmlns:p="http://schemas.openxmlformats.org/presentationml/2006/main">
+  <p:cSld>
+    <p:spTree>
+      <p:nvGrpSpPr>
+        <p:cNvPr id="1" name=""/>
+        <p:cNvGrpSpPr/>
+        <p:nvPr/>
+      </p:nvGrpSpPr>
+      <p:grpSpPr>
+        <a:xfrm>
+          <a:off x="0" y="0"/>
+          <a:ext cx="0" cy="0"/>
+          <a:chOff x="0" y="0"/>
+          <a:chExt cx="0" cy="0"/>
+        </a:xfrm>
+      </p:grpSpPr>
+      <p:sp>
+        <p:nvSpPr>
+          <p:cNvPr id="4" name="Title 3"/>
+          <p:cNvSpPr>
+            <a:spLocks noGrp="1"/>
+          </p:cNvSpPr>
+          <p:nvPr>
+            <p:ph type="title"/>
+          </p:nvPr>
+        </p:nvSpPr>
+        <p:spPr/>
+        <p:txBody>
+          <a:bodyPr/>
+          <a:lstStyle/>
+          <a:p>
+            <a:r>
+              <a:rPr lang="en-US" dirty="0" smtClean="0"/>
+              <a:t>limitations</a:t>
+            </a:r>
+            <a:endParaRPr lang="en-US" dirty="0"/>
+          </a:p>
+        </p:txBody>
+      </p:sp>
+      <p:sp>
+        <p:nvSpPr>
+          <p:cNvPr id="5" name="Content Placeholder 4"/>
+          <p:cNvSpPr>
+            <a:spLocks noGrp="1"/>
+          </p:cNvSpPr>
+          <p:nvPr>
+            <p:ph idx="1"/>
+          </p:nvPr>
+        </p:nvSpPr>
+        <p:spPr/>
+        <p:txBody>
+          <a:bodyPr/>
+          <a:lstStyle/>
+          <a:p>
+            <a:pPr marL="342900" indent="-342900">
+              <a:buFont typeface="Arial"/>
+              <a:buChar char="•"/>
+            </a:pPr>
+            <a:r>
+              <a:rPr lang="en-US" dirty="0" smtClean="0"/>
+              <a:t>Network connection major bottleneck</a:t>
+            </a:r>
+          </a:p>
+          <a:p>
+            <a:pPr marL="342900" indent="-342900">
+              <a:buFont typeface="Arial"/>
+              <a:buChar char="•"/>
+            </a:pPr>
+            <a:r>
+              <a:rPr lang="en-US" dirty="0" smtClean="0"/>
+              <a:t>Limitations of </a:t>
+            </a:r>
+            <a:r>
+              <a:rPr lang="en-US" dirty="0" err="1" smtClean="0"/>
+              <a:t>Aparapi</a:t>
+            </a:r>
+            <a:endParaRPr lang="en-US" dirty="0" smtClean="0"/>
+          </a:p>
+          <a:p>
+            <a:pPr marL="800100" lvl="1" indent="-342900">
+              <a:buFont typeface="Arial"/>
+              <a:buChar char="•"/>
+            </a:pPr>
+            <a:r>
+              <a:rPr lang="en-US" dirty="0" smtClean="0"/>
+              <a:t>Code translation</a:t>
+            </a:r>
+          </a:p>
+          <a:p>
+            <a:pPr marL="800100" lvl="1" indent="-342900">
+              <a:buFont typeface="Arial"/>
+              <a:buChar char="•"/>
+            </a:pPr>
+            <a:r>
+              <a:rPr lang="en-US" dirty="0" smtClean="0"/>
+              <a:t>Device support</a:t>
+            </a:r>
+          </a:p>
+          <a:p>
+            <a:pPr marL="342900" indent="-342900">
+              <a:buFont typeface="Arial"/>
+              <a:buChar char="•"/>
+            </a:pPr>
+            <a:r>
+              <a:rPr lang="en-US" dirty="0" err="1" smtClean="0"/>
+              <a:t>OpenCL</a:t>
+            </a:r>
+            <a:r>
+              <a:rPr lang="en-US" dirty="0" smtClean="0"/>
+              <a:t> device feature set currently ignored by scheduling</a:t>
+            </a:r>
+          </a:p>
+          <a:p>
+            <a:pPr marL="342900" indent="-342900">
+              <a:buFont typeface="Arial"/>
+              <a:buChar char="•"/>
+            </a:pPr>
+            <a:r>
+              <a:rPr lang="en-US" dirty="0" smtClean="0"/>
+              <a:t>Memory may become bottleneck when many jobs are executed in parallel</a:t>
+            </a:r>
+          </a:p>
+          <a:p>
+            <a:pPr marL="342900" indent="-342900">
+              <a:buFont typeface="Arial"/>
+              <a:buChar char="•"/>
+            </a:pPr>
+            <a:endParaRPr lang="en-US" dirty="0"/>
+          </a:p>
+        </p:txBody>
+      </p:sp>
+    </p:spTree>
+    <p:extLst>
+      <p:ext uri="{BB962C8B-B14F-4D97-AF65-F5344CB8AC3E}">
+        <p14:creationId xmlns:p14="http://schemas.microsoft.com/office/powerpoint/2010/main" val="3896321887"/>
+      </p:ext>
+    </p:extLst>
+  </p:cSld>
+  <p:clrMapOvr>
+    <a:masterClrMapping/>
+  </p:clrMapOvr>
+</p:sld>
+</file>
+
+<file path=ppt/slides/slide51.xml><?xml version="1.0" encoding="utf-8"?>
+<p:sld xmlns:a="http://schemas.openxmlformats.org/drawingml/2006/main" xmlns:r="http://schemas.openxmlformats.org/officeDocument/2006/relationships" xmlns:p="http://schemas.openxmlformats.org/presentationml/2006/main">
+  <p:cSld>
+    <p:spTree>
+      <p:nvGrpSpPr>
+        <p:cNvPr id="1" name=""/>
+        <p:cNvGrpSpPr/>
+        <p:nvPr/>
+      </p:nvGrpSpPr>
+      <p:grpSpPr>
+        <a:xfrm>
+          <a:off x="0" y="0"/>
+          <a:ext cx="0" cy="0"/>
+          <a:chOff x="0" y="0"/>
+          <a:chExt cx="0" cy="0"/>
+        </a:xfrm>
+      </p:grpSpPr>
+      <p:sp>
+        <p:nvSpPr>
+          <p:cNvPr id="2" name="Title 1"/>
+          <p:cNvSpPr>
+            <a:spLocks noGrp="1"/>
+          </p:cNvSpPr>
+          <p:nvPr>
+            <p:ph type="title"/>
+          </p:nvPr>
+        </p:nvSpPr>
+        <p:spPr/>
+        <p:txBody>
+          <a:bodyPr/>
+          <a:lstStyle/>
+          <a:p>
+            <a:r>
+              <a:rPr lang="en-US" dirty="0" smtClean="0"/>
+              <a:t>Achievements</a:t>
+            </a:r>
+            <a:endParaRPr lang="en-US" dirty="0"/>
+          </a:p>
+        </p:txBody>
+      </p:sp>
+      <p:sp>
+        <p:nvSpPr>
+          <p:cNvPr id="3" name="Content Placeholder 2"/>
+          <p:cNvSpPr>
+            <a:spLocks noGrp="1"/>
+          </p:cNvSpPr>
+          <p:nvPr>
+            <p:ph idx="1"/>
+          </p:nvPr>
+        </p:nvSpPr>
+        <p:spPr/>
+        <p:txBody>
+          <a:bodyPr/>
+          <a:lstStyle/>
+          <a:p>
+            <a:pPr marL="342900" indent="-342900">
+              <a:buFont typeface="Arial"/>
+              <a:buChar char="•"/>
+            </a:pPr>
+            <a:r>
+              <a:rPr lang="en-US" dirty="0" smtClean="0"/>
+              <a:t>Distributed computations on heterogeneous clusters</a:t>
+            </a:r>
+          </a:p>
+          <a:p>
+            <a:pPr marL="342900" indent="-342900">
+              <a:buFont typeface="Arial"/>
+              <a:buChar char="•"/>
+            </a:pPr>
+            <a:r>
+              <a:rPr lang="en-US" dirty="0" smtClean="0"/>
+              <a:t>Flat learning curve and little code necessary</a:t>
+            </a:r>
+          </a:p>
+          <a:p>
+            <a:pPr marL="342900" indent="-342900">
+              <a:buFont typeface="Arial"/>
+              <a:buChar char="•"/>
+            </a:pPr>
+            <a:r>
+              <a:rPr lang="en-US" dirty="0" smtClean="0"/>
+              <a:t>Cluster size can be dynamically increased by cloud resources</a:t>
+            </a:r>
+          </a:p>
+          <a:p>
+            <a:pPr marL="342900" indent="-342900">
+              <a:buFont typeface="Arial"/>
+              <a:buChar char="•"/>
+            </a:pPr>
+            <a:r>
+              <a:rPr lang="en-US" dirty="0" smtClean="0"/>
+              <a:t>Scheduling architecture adaptable to various use cases</a:t>
+            </a:r>
+          </a:p>
+          <a:p>
+            <a:pPr marL="342900" indent="-342900">
+              <a:buFont typeface="Arial"/>
+              <a:buChar char="•"/>
+            </a:pPr>
+            <a:r>
+              <a:rPr lang="en-US" dirty="0" smtClean="0"/>
+              <a:t>Small code base (less than 1500 Java LOC)</a:t>
+            </a:r>
+          </a:p>
+          <a:p>
+            <a:pPr marL="342900" indent="-342900">
+              <a:buFont typeface="Arial"/>
+              <a:buChar char="•"/>
+            </a:pPr>
+            <a:endParaRPr lang="en-US" dirty="0" smtClean="0"/>
+          </a:p>
+          <a:p>
+            <a:endParaRPr lang="en-US" dirty="0"/>
+          </a:p>
+        </p:txBody>
+      </p:sp>
+    </p:spTree>
+    <p:extLst>
+      <p:ext uri="{BB962C8B-B14F-4D97-AF65-F5344CB8AC3E}">
+        <p14:creationId xmlns:p14="http://schemas.microsoft.com/office/powerpoint/2010/main" val="1678207550"/>
+      </p:ext>
+    </p:extLst>
+  </p:cSld>
+  <p:clrMapOvr>
+    <a:masterClrMapping/>
+  </p:clrMapOvr>
+</p:sld>
+</file>
+
+<file path=ppt/slides/slide52.xml><?xml version="1.0" encoding="utf-8"?>
+<p:sld xmlns:a="http://schemas.openxmlformats.org/drawingml/2006/main" xmlns:r="http://schemas.openxmlformats.org/officeDocument/2006/relationships" xmlns:p="http://schemas.openxmlformats.org/presentationml/2006/main">
+  <p:cSld>
+    <p:spTree>
+      <p:nvGrpSpPr>
+        <p:cNvPr id="1" name=""/>
+        <p:cNvGrpSpPr/>
+        <p:nvPr/>
+      </p:nvGrpSpPr>
+      <p:grpSpPr>
+        <a:xfrm>
+          <a:off x="0" y="0"/>
+          <a:ext cx="0" cy="0"/>
+          <a:chOff x="0" y="0"/>
+          <a:chExt cx="0" cy="0"/>
+        </a:xfrm>
+      </p:grpSpPr>
+      <p:sp>
+        <p:nvSpPr>
+          <p:cNvPr id="6" name="Title 5"/>
+          <p:cNvSpPr>
+            <a:spLocks noGrp="1"/>
+          </p:cNvSpPr>
+          <p:nvPr>
+            <p:ph type="title"/>
+          </p:nvPr>
+        </p:nvSpPr>
+        <p:spPr/>
+        <p:txBody>
+          <a:bodyPr/>
+          <a:lstStyle/>
+          <a:p>
+            <a:r>
+              <a:rPr lang="en-US" dirty="0" smtClean="0"/>
+              <a:t>Source codes</a:t>
+            </a:r>
+            <a:endParaRPr lang="en-US" dirty="0"/>
+          </a:p>
+        </p:txBody>
+      </p:sp>
+      <p:sp>
+        <p:nvSpPr>
+          <p:cNvPr id="7" name="Content Placeholder 6"/>
+          <p:cNvSpPr>
+            <a:spLocks noGrp="1"/>
+          </p:cNvSpPr>
+          <p:nvPr>
+            <p:ph idx="1"/>
+          </p:nvPr>
+        </p:nvSpPr>
+        <p:spPr/>
+        <p:txBody>
+          <a:bodyPr/>
+          <a:lstStyle/>
+          <a:p>
+            <a:r>
+              <a:rPr lang="en-US" dirty="0">
+                <a:hlinkClick r:id="rId2"/>
+              </a:rPr>
+              <a:t>https://github.com/florianroesler/</a:t>
+            </a:r>
+            <a:r>
+              <a:rPr lang="en-US" dirty="0" smtClean="0">
+                <a:hlinkClick r:id="rId2"/>
+              </a:rPr>
+              <a:t>dopencl</a:t>
+            </a:r>
+            <a:endParaRPr lang="en-US" dirty="0" smtClean="0"/>
+          </a:p>
+          <a:p>
+            <a:r>
+              <a:rPr lang="en-US" dirty="0">
+                <a:hlinkClick r:id="rId3"/>
+              </a:rPr>
+              <a:t>https://github.com/florianroesler/</a:t>
+            </a:r>
+            <a:r>
+              <a:rPr lang="en-US" dirty="0" smtClean="0">
+                <a:hlinkClick r:id="rId3"/>
+              </a:rPr>
+              <a:t>aparapi</a:t>
+            </a:r>
+            <a:endParaRPr lang="en-US" dirty="0" smtClean="0"/>
+          </a:p>
+          <a:p>
+            <a:r>
+              <a:rPr lang="en-US" dirty="0">
+                <a:hlinkClick r:id="rId4"/>
+              </a:rPr>
+              <a:t>https://github.com/florianroesler/</a:t>
+            </a:r>
+            <a:r>
+              <a:rPr lang="en-US" dirty="0" smtClean="0">
+                <a:hlinkClick r:id="rId4"/>
+              </a:rPr>
+              <a:t>dynamopencl</a:t>
+            </a:r>
+            <a:endParaRPr lang="en-US" dirty="0" smtClean="0"/>
+          </a:p>
+          <a:p>
+            <a:r>
+              <a:rPr lang="en-US" dirty="0">
+                <a:hlinkClick r:id="rId5"/>
+              </a:rPr>
+              <a:t>https://github.com/florianroesler/dynamo-</a:t>
+            </a:r>
+            <a:r>
+              <a:rPr lang="en-US" dirty="0" smtClean="0">
+                <a:hlinkClick r:id="rId5"/>
+              </a:rPr>
+              <a:t>server</a:t>
+            </a:r>
+            <a:endParaRPr lang="en-US" dirty="0" smtClean="0"/>
+          </a:p>
+          <a:p>
+            <a:endParaRPr lang="en-US" dirty="0"/>
+          </a:p>
+        </p:txBody>
+      </p:sp>
+    </p:spTree>
+    <p:extLst>
+      <p:ext uri="{BB962C8B-B14F-4D97-AF65-F5344CB8AC3E}">
+        <p14:creationId xmlns:p14="http://schemas.microsoft.com/office/powerpoint/2010/main" val="2512713343"/>
+      </p:ext>
+    </p:extLst>
+  </p:cSld>
+  <p:clrMapOvr>
+    <a:masterClrMapping/>
+  </p:clrMapOvr>
+</p:sld>
+</file>
+
 <file path=ppt/slides/slide6.xml><?xml version="1.0" encoding="utf-8"?>
 <p:sld xmlns:a="http://schemas.openxmlformats.org/drawingml/2006/main" xmlns:r="http://schemas.openxmlformats.org/officeDocument/2006/relationships" xmlns:p="http://schemas.openxmlformats.org/presentationml/2006/main">
   <p:cSld>
@@ -9147,6 +9869,58 @@
           <a:bodyPr/>
           <a:lstStyle/>
           <a:p>
+            <a:pPr marL="342900" indent="-342900">
+              <a:buFont typeface="Arial"/>
+              <a:buChar char="•"/>
+            </a:pPr>
+            <a:r>
+              <a:rPr lang="en-US" dirty="0" err="1" smtClean="0"/>
+              <a:t>rCUDA</a:t>
+            </a:r>
+            <a:endParaRPr lang="en-US" dirty="0" smtClean="0"/>
+          </a:p>
+          <a:p>
+            <a:pPr marL="342900" indent="-342900">
+              <a:buFont typeface="Arial"/>
+              <a:buChar char="•"/>
+            </a:pPr>
+            <a:r>
+              <a:rPr lang="en-US" dirty="0"/>
+              <a:t>Virtualizing CUDA Enabled GPGPUs on ARM Clusters </a:t>
+            </a:r>
+            <a:endParaRPr lang="en-US" dirty="0" smtClean="0"/>
+          </a:p>
+          <a:p>
+            <a:pPr marL="342900" indent="-342900">
+              <a:buFont typeface="Arial"/>
+              <a:buChar char="•"/>
+            </a:pPr>
+            <a:r>
+              <a:rPr lang="en-US" dirty="0" err="1" smtClean="0"/>
+              <a:t>DistCL</a:t>
+            </a:r>
+            <a:endParaRPr lang="en-US" dirty="0" smtClean="0"/>
+          </a:p>
+          <a:p>
+            <a:pPr marL="342900" indent="-342900">
+              <a:buFont typeface="Arial"/>
+              <a:buChar char="•"/>
+            </a:pPr>
+            <a:r>
+              <a:rPr lang="en-US" dirty="0" err="1" smtClean="0"/>
+              <a:t>Hadoop+Aparapi</a:t>
+            </a:r>
+            <a:endParaRPr lang="en-US" dirty="0"/>
+          </a:p>
+          <a:p>
+            <a:pPr marL="342900" indent="-342900">
+              <a:buFont typeface="Arial"/>
+              <a:buChar char="•"/>
+            </a:pPr>
+            <a:r>
+              <a:rPr lang="en-US" dirty="0" err="1" smtClean="0"/>
+              <a:t>SnuCL</a:t>
+            </a:r>
             <a:endParaRPr lang="en-US" dirty="0"/>
           </a:p>
         </p:txBody>

</xml_diff>